<commit_message>
Fix mistakes on soc image
</commit_message>
<xml_diff>
--- a/figs/latte24/figs.pptx
+++ b/figs/latte24/figs.pptx
@@ -9828,8 +9828,8 @@
               <a:avLst>
                 <a:gd name="adj1" fmla="val 18750"/>
                 <a:gd name="adj2" fmla="val -8333"/>
-                <a:gd name="adj3" fmla="val 140033"/>
-                <a:gd name="adj4" fmla="val -32098"/>
+                <a:gd name="adj3" fmla="val 193673"/>
+                <a:gd name="adj4" fmla="val -37742"/>
               </a:avLst>
             </a:prstGeom>
             <a:noFill/>
@@ -11559,9 +11559,9 @@
           <p:grpSpPr>
             <a:xfrm>
               <a:off x="3245620" y="1595410"/>
-              <a:ext cx="3474982" cy="1977830"/>
+              <a:ext cx="3474982" cy="2410021"/>
               <a:chOff x="3245620" y="1595410"/>
-              <a:chExt cx="3474982" cy="1977830"/>
+              <a:chExt cx="3474982" cy="2410021"/>
             </a:xfrm>
           </p:grpSpPr>
           <p:sp>
@@ -11653,13 +11653,15 @@
                   </a:ext>
                 </a:extLst>
               </p:cNvPr>
-              <p:cNvCxnSpPr/>
+              <p:cNvCxnSpPr>
+                <a:cxnSpLocks/>
+              </p:cNvCxnSpPr>
               <p:nvPr/>
             </p:nvCxnSpPr>
             <p:spPr>
               <a:xfrm>
                 <a:off x="4950084" y="3362298"/>
-                <a:ext cx="0" cy="210942"/>
+                <a:ext cx="0" cy="643133"/>
               </a:xfrm>
               <a:prstGeom prst="straightConnector1">
                 <a:avLst/>

</xml_diff>